<commit_message>
new PUF viability plots
</commit_message>
<xml_diff>
--- a/L2 Design Submission/Presentation.pptx
+++ b/L2 Design Submission/Presentation.pptx
@@ -127,7 +127,7 @@
 <p1510:revInfo xmlns:a="http://schemas.openxmlformats.org/drawingml/2006/main" xmlns:r="http://schemas.openxmlformats.org/officeDocument/2006/relationships" xmlns:p1510="http://schemas.microsoft.com/office/powerpoint/2015/10/main">
   <p1510:revLst>
     <p1510:client id="{57CEB53F-B38B-4A61-93A6-42FF3E4E4421}" v="49" dt="2022-06-19T10:21:29.891"/>
-    <p1510:client id="{9693A05C-D827-7349-23A7-CA3B5B133C4E}" v="89" dt="2022-06-19T11:52:59.772"/>
+    <p1510:client id="{9693A05C-D827-7349-23A7-CA3B5B133C4E}" v="92" dt="2022-06-19T11:58:54.217"/>
   </p1510:revLst>
 </p1510:revInfo>
 </file>
@@ -818,7 +818,7 @@
   <pc:docChgLst>
     <pc:chgData name="HARRISON, ETHAN S. (Student)" userId="S::qjlm25@durham.ac.uk::451ea83b-4b44-49ac-91c2-758c3267589a" providerId="AD" clId="Web-{9693A05C-D827-7349-23A7-CA3B5B133C4E}"/>
     <pc:docChg chg="addSld modSld">
-      <pc:chgData name="HARRISON, ETHAN S. (Student)" userId="S::qjlm25@durham.ac.uk::451ea83b-4b44-49ac-91c2-758c3267589a" providerId="AD" clId="Web-{9693A05C-D827-7349-23A7-CA3B5B133C4E}" dt="2022-06-19T11:53:05.163" v="175"/>
+      <pc:chgData name="HARRISON, ETHAN S. (Student)" userId="S::qjlm25@durham.ac.uk::451ea83b-4b44-49ac-91c2-758c3267589a" providerId="AD" clId="Web-{9693A05C-D827-7349-23A7-CA3B5B133C4E}" dt="2022-06-19T11:59:11.796" v="248"/>
       <pc:docMkLst>
         <pc:docMk/>
       </pc:docMkLst>
@@ -915,7 +915,7 @@
         </pc:spChg>
       </pc:sldChg>
       <pc:sldChg chg="delSp modSp new modNotes">
-        <pc:chgData name="HARRISON, ETHAN S. (Student)" userId="S::qjlm25@durham.ac.uk::451ea83b-4b44-49ac-91c2-758c3267589a" providerId="AD" clId="Web-{9693A05C-D827-7349-23A7-CA3B5B133C4E}" dt="2022-06-19T11:53:05.163" v="175"/>
+        <pc:chgData name="HARRISON, ETHAN S. (Student)" userId="S::qjlm25@durham.ac.uk::451ea83b-4b44-49ac-91c2-758c3267589a" providerId="AD" clId="Web-{9693A05C-D827-7349-23A7-CA3B5B133C4E}" dt="2022-06-19T11:53:28.319" v="190"/>
         <pc:sldMkLst>
           <pc:docMk/>
           <pc:sldMk cId="596182796" sldId="261"/>
@@ -937,8 +937,8 @@
           </ac:spMkLst>
         </pc:spChg>
       </pc:sldChg>
-      <pc:sldChg chg="delSp modSp new">
-        <pc:chgData name="HARRISON, ETHAN S. (Student)" userId="S::qjlm25@durham.ac.uk::451ea83b-4b44-49ac-91c2-758c3267589a" providerId="AD" clId="Web-{9693A05C-D827-7349-23A7-CA3B5B133C4E}" dt="2022-06-19T11:48:08.984" v="72" actId="20577"/>
+      <pc:sldChg chg="delSp modSp new modNotes">
+        <pc:chgData name="HARRISON, ETHAN S. (Student)" userId="S::qjlm25@durham.ac.uk::451ea83b-4b44-49ac-91c2-758c3267589a" providerId="AD" clId="Web-{9693A05C-D827-7349-23A7-CA3B5B133C4E}" dt="2022-06-19T11:58:26.217" v="219"/>
         <pc:sldMkLst>
           <pc:docMk/>
           <pc:sldMk cId="1337341843" sldId="262"/>
@@ -960,8 +960,8 @@
           </ac:spMkLst>
         </pc:spChg>
       </pc:sldChg>
-      <pc:sldChg chg="delSp modSp new">
-        <pc:chgData name="HARRISON, ETHAN S. (Student)" userId="S::qjlm25@durham.ac.uk::451ea83b-4b44-49ac-91c2-758c3267589a" providerId="AD" clId="Web-{9693A05C-D827-7349-23A7-CA3B5B133C4E}" dt="2022-06-19T11:48:48.063" v="76"/>
+      <pc:sldChg chg="delSp modSp new modNotes">
+        <pc:chgData name="HARRISON, ETHAN S. (Student)" userId="S::qjlm25@durham.ac.uk::451ea83b-4b44-49ac-91c2-758c3267589a" providerId="AD" clId="Web-{9693A05C-D827-7349-23A7-CA3B5B133C4E}" dt="2022-06-19T11:58:50.889" v="235"/>
         <pc:sldMkLst>
           <pc:docMk/>
           <pc:sldMk cId="4072092364" sldId="263"/>
@@ -983,8 +983,8 @@
           </ac:spMkLst>
         </pc:spChg>
       </pc:sldChg>
-      <pc:sldChg chg="delSp modSp new">
-        <pc:chgData name="HARRISON, ETHAN S. (Student)" userId="S::qjlm25@durham.ac.uk::451ea83b-4b44-49ac-91c2-758c3267589a" providerId="AD" clId="Web-{9693A05C-D827-7349-23A7-CA3B5B133C4E}" dt="2022-06-19T11:50:19.940" v="81" actId="20577"/>
+      <pc:sldChg chg="delSp modSp new modNotes">
+        <pc:chgData name="HARRISON, ETHAN S. (Student)" userId="S::qjlm25@durham.ac.uk::451ea83b-4b44-49ac-91c2-758c3267589a" providerId="AD" clId="Web-{9693A05C-D827-7349-23A7-CA3B5B133C4E}" dt="2022-06-19T11:59:11.796" v="248"/>
         <pc:sldMkLst>
           <pc:docMk/>
           <pc:sldMk cId="2525438925" sldId="264"/>
@@ -1778,9 +1778,12 @@
           <a:bodyPr/>
           <a:lstStyle/>
           <a:p>
-            <a:endParaRPr lang="en-US" dirty="0">
-              <a:cs typeface="Calibri"/>
-            </a:endParaRPr>
+            <a:r>
+              <a:rPr lang="en-US" dirty="0">
+                <a:cs typeface="Calibri"/>
+              </a:rPr>
+              <a:t>Show how data was acquired from the SRAM and what data was required and why</a:t>
+            </a:r>
           </a:p>
         </p:txBody>
       </p:sp>
@@ -1810,6 +1813,294 @@
     <p:extLst>
       <p:ext uri="{BB962C8B-B14F-4D97-AF65-F5344CB8AC3E}">
         <p14:creationId xmlns:p14="http://schemas.microsoft.com/office/powerpoint/2010/main" val="917172329"/>
+      </p:ext>
+    </p:extLst>
+  </p:cSld>
+  <p:clrMapOvr>
+    <a:masterClrMapping/>
+  </p:clrMapOvr>
+</p:notes>
+</file>
+
+<file path=ppt/notesSlides/notesSlide6.xml><?xml version="1.0" encoding="utf-8"?>
+<p:notes xmlns:a="http://schemas.openxmlformats.org/drawingml/2006/main" xmlns:r="http://schemas.openxmlformats.org/officeDocument/2006/relationships" xmlns:p="http://schemas.openxmlformats.org/presentationml/2006/main">
+  <p:cSld>
+    <p:spTree>
+      <p:nvGrpSpPr>
+        <p:cNvPr id="1" name=""/>
+        <p:cNvGrpSpPr/>
+        <p:nvPr/>
+      </p:nvGrpSpPr>
+      <p:grpSpPr>
+        <a:xfrm>
+          <a:off x="0" y="0"/>
+          <a:ext cx="0" cy="0"/>
+          <a:chOff x="0" y="0"/>
+          <a:chExt cx="0" cy="0"/>
+        </a:xfrm>
+      </p:grpSpPr>
+      <p:sp>
+        <p:nvSpPr>
+          <p:cNvPr id="2" name="Slide Image Placeholder 1"/>
+          <p:cNvSpPr>
+            <a:spLocks noGrp="1" noRot="1" noChangeAspect="1"/>
+          </p:cNvSpPr>
+          <p:nvPr>
+            <p:ph type="sldImg"/>
+          </p:nvPr>
+        </p:nvSpPr>
+        <p:spPr/>
+      </p:sp>
+      <p:sp>
+        <p:nvSpPr>
+          <p:cNvPr id="3" name="Notes Placeholder 2"/>
+          <p:cNvSpPr>
+            <a:spLocks noGrp="1"/>
+          </p:cNvSpPr>
+          <p:nvPr>
+            <p:ph type="body" idx="1"/>
+          </p:nvPr>
+        </p:nvSpPr>
+        <p:spPr/>
+        <p:txBody>
+          <a:bodyPr/>
+          <a:lstStyle/>
+          <a:p>
+            <a:r>
+              <a:rPr lang="en-US" dirty="0">
+                <a:cs typeface="Calibri"/>
+              </a:rPr>
+              <a:t>Briefly </a:t>
+            </a:r>
+            <a:r>
+              <a:rPr lang="en-US" dirty="0" err="1">
+                <a:cs typeface="Calibri"/>
+              </a:rPr>
+              <a:t>summarise</a:t>
+            </a:r>
+            <a:r>
+              <a:rPr lang="en-US" dirty="0">
+                <a:cs typeface="Calibri"/>
+              </a:rPr>
+              <a:t> the coding done to calculate hamming distance and carry out the appropriate statistics</a:t>
+            </a:r>
+          </a:p>
+        </p:txBody>
+      </p:sp>
+      <p:sp>
+        <p:nvSpPr>
+          <p:cNvPr id="4" name="Slide Number Placeholder 3"/>
+          <p:cNvSpPr>
+            <a:spLocks noGrp="1"/>
+          </p:cNvSpPr>
+          <p:nvPr>
+            <p:ph type="sldNum" sz="quarter" idx="5"/>
+          </p:nvPr>
+        </p:nvSpPr>
+        <p:spPr/>
+        <p:txBody>
+          <a:bodyPr/>
+          <a:lstStyle/>
+          <a:p>
+            <a:fld id="{2364374A-15A0-4DA2-B48E-AFF569AD8003}" type="slidenum">
+              <a:t>7</a:t>
+            </a:fld>
+            <a:endParaRPr lang="en-US"/>
+          </a:p>
+        </p:txBody>
+      </p:sp>
+    </p:spTree>
+    <p:extLst>
+      <p:ext uri="{BB962C8B-B14F-4D97-AF65-F5344CB8AC3E}">
+        <p14:creationId xmlns:p14="http://schemas.microsoft.com/office/powerpoint/2010/main" val="169698134"/>
+      </p:ext>
+    </p:extLst>
+  </p:cSld>
+  <p:clrMapOvr>
+    <a:masterClrMapping/>
+  </p:clrMapOvr>
+</p:notes>
+</file>
+
+<file path=ppt/notesSlides/notesSlide7.xml><?xml version="1.0" encoding="utf-8"?>
+<p:notes xmlns:a="http://schemas.openxmlformats.org/drawingml/2006/main" xmlns:r="http://schemas.openxmlformats.org/officeDocument/2006/relationships" xmlns:p="http://schemas.openxmlformats.org/presentationml/2006/main">
+  <p:cSld>
+    <p:spTree>
+      <p:nvGrpSpPr>
+        <p:cNvPr id="1" name=""/>
+        <p:cNvGrpSpPr/>
+        <p:nvPr/>
+      </p:nvGrpSpPr>
+      <p:grpSpPr>
+        <a:xfrm>
+          <a:off x="0" y="0"/>
+          <a:ext cx="0" cy="0"/>
+          <a:chOff x="0" y="0"/>
+          <a:chExt cx="0" cy="0"/>
+        </a:xfrm>
+      </p:grpSpPr>
+      <p:sp>
+        <p:nvSpPr>
+          <p:cNvPr id="2" name="Slide Image Placeholder 1"/>
+          <p:cNvSpPr>
+            <a:spLocks noGrp="1" noRot="1" noChangeAspect="1"/>
+          </p:cNvSpPr>
+          <p:nvPr>
+            <p:ph type="sldImg"/>
+          </p:nvPr>
+        </p:nvSpPr>
+        <p:spPr/>
+      </p:sp>
+      <p:sp>
+        <p:nvSpPr>
+          <p:cNvPr id="3" name="Notes Placeholder 2"/>
+          <p:cNvSpPr>
+            <a:spLocks noGrp="1"/>
+          </p:cNvSpPr>
+          <p:nvPr>
+            <p:ph type="body" idx="1"/>
+          </p:nvPr>
+        </p:nvSpPr>
+        <p:spPr/>
+        <p:txBody>
+          <a:bodyPr/>
+          <a:lstStyle/>
+          <a:p>
+            <a:r>
+              <a:rPr lang="en-US" dirty="0">
+                <a:cs typeface="Calibri"/>
+              </a:rPr>
+              <a:t>Show figures from the report and discuss what can be inferred from them</a:t>
+            </a:r>
+          </a:p>
+        </p:txBody>
+      </p:sp>
+      <p:sp>
+        <p:nvSpPr>
+          <p:cNvPr id="4" name="Slide Number Placeholder 3"/>
+          <p:cNvSpPr>
+            <a:spLocks noGrp="1"/>
+          </p:cNvSpPr>
+          <p:nvPr>
+            <p:ph type="sldNum" sz="quarter" idx="5"/>
+          </p:nvPr>
+        </p:nvSpPr>
+        <p:spPr/>
+        <p:txBody>
+          <a:bodyPr/>
+          <a:lstStyle/>
+          <a:p>
+            <a:fld id="{2364374A-15A0-4DA2-B48E-AFF569AD8003}" type="slidenum">
+              <a:t>8</a:t>
+            </a:fld>
+            <a:endParaRPr lang="en-US"/>
+          </a:p>
+        </p:txBody>
+      </p:sp>
+    </p:spTree>
+    <p:extLst>
+      <p:ext uri="{BB962C8B-B14F-4D97-AF65-F5344CB8AC3E}">
+        <p14:creationId xmlns:p14="http://schemas.microsoft.com/office/powerpoint/2010/main" val="2810691935"/>
+      </p:ext>
+    </p:extLst>
+  </p:cSld>
+  <p:clrMapOvr>
+    <a:masterClrMapping/>
+  </p:clrMapOvr>
+</p:notes>
+</file>
+
+<file path=ppt/notesSlides/notesSlide8.xml><?xml version="1.0" encoding="utf-8"?>
+<p:notes xmlns:a="http://schemas.openxmlformats.org/drawingml/2006/main" xmlns:r="http://schemas.openxmlformats.org/officeDocument/2006/relationships" xmlns:p="http://schemas.openxmlformats.org/presentationml/2006/main">
+  <p:cSld>
+    <p:spTree>
+      <p:nvGrpSpPr>
+        <p:cNvPr id="1" name=""/>
+        <p:cNvGrpSpPr/>
+        <p:nvPr/>
+      </p:nvGrpSpPr>
+      <p:grpSpPr>
+        <a:xfrm>
+          <a:off x="0" y="0"/>
+          <a:ext cx="0" cy="0"/>
+          <a:chOff x="0" y="0"/>
+          <a:chExt cx="0" cy="0"/>
+        </a:xfrm>
+      </p:grpSpPr>
+      <p:sp>
+        <p:nvSpPr>
+          <p:cNvPr id="2" name="Slide Image Placeholder 1"/>
+          <p:cNvSpPr>
+            <a:spLocks noGrp="1" noRot="1" noChangeAspect="1"/>
+          </p:cNvSpPr>
+          <p:nvPr>
+            <p:ph type="sldImg"/>
+          </p:nvPr>
+        </p:nvSpPr>
+        <p:spPr/>
+      </p:sp>
+      <p:sp>
+        <p:nvSpPr>
+          <p:cNvPr id="3" name="Notes Placeholder 2"/>
+          <p:cNvSpPr>
+            <a:spLocks noGrp="1"/>
+          </p:cNvSpPr>
+          <p:nvPr>
+            <p:ph type="body" idx="1"/>
+          </p:nvPr>
+        </p:nvSpPr>
+        <p:spPr/>
+        <p:txBody>
+          <a:bodyPr/>
+          <a:lstStyle/>
+          <a:p>
+            <a:r>
+              <a:rPr lang="en-US" dirty="0">
+                <a:cs typeface="Calibri"/>
+              </a:rPr>
+              <a:t>Argue as to whether a </a:t>
+            </a:r>
+            <a:r>
+              <a:rPr lang="en-US" dirty="0" err="1">
+                <a:cs typeface="Calibri"/>
+              </a:rPr>
+              <a:t>microbit</a:t>
+            </a:r>
+            <a:r>
+              <a:rPr lang="en-US">
+                <a:cs typeface="Calibri"/>
+              </a:rPr>
+              <a:t> is a viable device for creating PUFs</a:t>
+            </a:r>
+          </a:p>
+        </p:txBody>
+      </p:sp>
+      <p:sp>
+        <p:nvSpPr>
+          <p:cNvPr id="4" name="Slide Number Placeholder 3"/>
+          <p:cNvSpPr>
+            <a:spLocks noGrp="1"/>
+          </p:cNvSpPr>
+          <p:nvPr>
+            <p:ph type="sldNum" sz="quarter" idx="5"/>
+          </p:nvPr>
+        </p:nvSpPr>
+        <p:spPr/>
+        <p:txBody>
+          <a:bodyPr/>
+          <a:lstStyle/>
+          <a:p>
+            <a:fld id="{2364374A-15A0-4DA2-B48E-AFF569AD8003}" type="slidenum">
+              <a:t>9</a:t>
+            </a:fld>
+            <a:endParaRPr lang="en-US"/>
+          </a:p>
+        </p:txBody>
+      </p:sp>
+    </p:spTree>
+    <p:extLst>
+      <p:ext uri="{BB962C8B-B14F-4D97-AF65-F5344CB8AC3E}">
+        <p14:creationId xmlns:p14="http://schemas.microsoft.com/office/powerpoint/2010/main" val="78975407"/>
       </p:ext>
     </p:extLst>
   </p:cSld>

</xml_diff>